<commit_message>
Added comics picture to architecture presentation
</commit_message>
<xml_diff>
--- a/Presentation/lesson-14-architecture.pptx
+++ b/Presentation/lesson-14-architecture.pptx
@@ -210,7 +210,7 @@
           <a:p>
             <a:fld id="{B24A7054-7FFB-49F4-A126-5DF6E687FF53}" type="datetimeFigureOut">
               <a:rPr lang="ru-RU" smtClean="0"/>
-              <a:t>27.03.2013</a:t>
+              <a:t>29.04.2013</a:t>
             </a:fld>
             <a:endParaRPr lang="ru-RU"/>
           </a:p>
@@ -1273,7 +1273,7 @@
           <a:p>
             <a:fld id="{8E6E6A2A-E9D3-4A0D-B04A-ABDD367A1E08}" type="datetimeFigureOut">
               <a:rPr lang="ru-RU" smtClean="0"/>
-              <a:t>27.03.2013</a:t>
+              <a:t>29.04.2013</a:t>
             </a:fld>
             <a:endParaRPr lang="ru-RU"/>
           </a:p>
@@ -2721,7 +2721,7 @@
           <a:p>
             <a:fld id="{AC3D3127-B7C4-45E3-9797-C527EC9FDD78}" type="datetimeFigureOut">
               <a:rPr lang="ru-RU" smtClean="0"/>
-              <a:t>27.03.2013</a:t>
+              <a:t>29.04.2013</a:t>
             </a:fld>
             <a:endParaRPr lang="ru-RU"/>
           </a:p>

</xml_diff>